<commit_message>
added MAPE metric instead of EVS & re-run model pipeline ..
</commit_message>
<xml_diff>
--- a/VISL.pptx
+++ b/VISL.pptx
@@ -121,6 +121,11 @@
       </a:defRPr>
     </a:lvl9pPr>
   </p:defaultTextStyle>
+  <p:extLst>
+    <p:ext uri="{EFAFB233-063F-42B5-8137-9DF3F51BA10A}">
+      <p15:sldGuideLst xmlns:p15="http://schemas.microsoft.com/office/powerpoint/2012/main"/>
+    </p:ext>
+  </p:extLst>
 </p:presentation>
 </file>
 
@@ -211,6 +216,151 @@
 </inkml:ink>
 </file>
 
+<file path=ppt/ink/ink4.xml><?xml version="1.0" encoding="utf-8"?>
+<inkml:ink xmlns:inkml="http://www.w3.org/2003/InkML">
+  <inkml:definitions>
+    <inkml:context xml:id="ctx0">
+      <inkml:inkSource xml:id="inkSrc0">
+        <inkml:traceFormat>
+          <inkml:channel name="X" type="integer" min="-2.14748E9" max="2.14748E9" units="cm"/>
+          <inkml:channel name="Y" type="integer" min="-2.14748E9" max="2.14748E9" units="cm"/>
+        </inkml:traceFormat>
+        <inkml:channelProperties>
+          <inkml:channelProperty channel="X" name="resolution" value="1000" units="1/cm"/>
+          <inkml:channelProperty channel="Y" name="resolution" value="1000" units="1/cm"/>
+        </inkml:channelProperties>
+      </inkml:inkSource>
+      <inkml:timestamp xml:id="ts0" timeString="2025-06-15T09:13:53.346"/>
+    </inkml:context>
+    <inkml:brush xml:id="br0">
+      <inkml:brushProperty name="width" value="0.3" units="cm"/>
+      <inkml:brushProperty name="height" value="0.6" units="cm"/>
+      <inkml:brushProperty name="color" value="#FFFC00"/>
+      <inkml:brushProperty name="tip" value="rectangle"/>
+      <inkml:brushProperty name="rasterOp" value="maskPen"/>
+      <inkml:brushProperty name="ignorePressure" value="1"/>
+    </inkml:brush>
+  </inkml:definitions>
+  <inkml:trace contextRef="#ctx0" brushRef="#br0">2177 59,'-1'-2,"1"0,-1 0,1 0,-1 0,1 0,-1 0,0 0,0 0,0 1,0-1,0 0,-1 1,1-1,0 0,-1 1,1 0,-1-1,0 1,1 0,-1 0,0 0,0 0,1 0,-1 0,0 1,-3-2,-7-1,1-1,-1 2,-15-2,-28 0,-1 3,-94 11,42-2,-373-1,348-8,90 3,-65 12,-12 1,-131-10,237-4,0 1,1 0,-1 1,1 0,0 1,0 0,-15 8,11-5,-1 0,1-1,-25 4,-20-4,-120-3,156-3,20-1,1 1,-1 0,1 1,-1-1,0 1,1 0,-1 1,1-1,-10 5,-7 9</inkml:trace>
+</inkml:ink>
+</file>
+
+<file path=ppt/ink/ink5.xml><?xml version="1.0" encoding="utf-8"?>
+<inkml:ink xmlns:inkml="http://www.w3.org/2003/InkML">
+  <inkml:definitions>
+    <inkml:context xml:id="ctx0">
+      <inkml:inkSource xml:id="inkSrc0">
+        <inkml:traceFormat>
+          <inkml:channel name="X" type="integer" min="-2.14748E9" max="2.14748E9" units="cm"/>
+          <inkml:channel name="Y" type="integer" min="-2.14748E9" max="2.14748E9" units="cm"/>
+        </inkml:traceFormat>
+        <inkml:channelProperties>
+          <inkml:channelProperty channel="X" name="resolution" value="1000" units="1/cm"/>
+          <inkml:channelProperty channel="Y" name="resolution" value="1000" units="1/cm"/>
+        </inkml:channelProperties>
+      </inkml:inkSource>
+      <inkml:timestamp xml:id="ts0" timeString="2025-06-15T09:16:47.167"/>
+    </inkml:context>
+    <inkml:brush xml:id="br0">
+      <inkml:brushProperty name="width" value="0.3" units="cm"/>
+      <inkml:brushProperty name="height" value="0.6" units="cm"/>
+      <inkml:brushProperty name="color" value="#FFFC00"/>
+      <inkml:brushProperty name="tip" value="rectangle"/>
+      <inkml:brushProperty name="rasterOp" value="maskPen"/>
+      <inkml:brushProperty name="ignorePressure" value="1"/>
+    </inkml:brush>
+  </inkml:definitions>
+  <inkml:trace contextRef="#ctx0" brushRef="#br0">0 1,'0'3,"1"0,-1 0,1 0,-1 0,1 0,0 0,0 0,1 0,-1 0,0 0,1-1,0 1,0-1,0 1,0-1,0 1,0-1,0 0,6 3,4 3,0 0,1-1,16 6,6 4,-18-7,0-1,1 0,1-2,-1 0,1 0,0-2,1-1,-1 0,40 2,-46-6,23 2,1-2,0-1,0-2,59-12,-73 11,0 1,1 1,-1 1,0 1,1 1,-1 1,30 6,57 4,175-11,-150-2,-115 3,0 0,0 2,0 0,-1 1,1 1,-1 1,26 13,-19-8,1-2,52 14,-18-16,1-3,0-2,68-6,-32 0,-47 0,-2-3,78-18,-4 1,-80 16,1 1,0 3,1 1,-1 3,0 1,50 10,-34-2,118 6,64-18,-100 0,1296 2,-1406-2,-2-2,1 0,0-2,38-13,-36 9,2 1,-1 2,38-3,262 9,-156 4,-115-1,115 17,-77-8,-1-5,122-7,-91-1,-8 1,-93 1</inkml:trace>
+</inkml:ink>
+</file>
+
+<file path=ppt/ink/ink6.xml><?xml version="1.0" encoding="utf-8"?>
+<inkml:ink xmlns:inkml="http://www.w3.org/2003/InkML">
+  <inkml:definitions>
+    <inkml:context xml:id="ctx0">
+      <inkml:inkSource xml:id="inkSrc0">
+        <inkml:traceFormat>
+          <inkml:channel name="X" type="integer" min="-2.14748E9" max="2.14748E9" units="cm"/>
+          <inkml:channel name="Y" type="integer" min="-2.14748E9" max="2.14748E9" units="cm"/>
+        </inkml:traceFormat>
+        <inkml:channelProperties>
+          <inkml:channelProperty channel="X" name="resolution" value="1000" units="1/cm"/>
+          <inkml:channelProperty channel="Y" name="resolution" value="1000" units="1/cm"/>
+        </inkml:channelProperties>
+      </inkml:inkSource>
+      <inkml:timestamp xml:id="ts0" timeString="2025-06-16T09:49:41.414"/>
+    </inkml:context>
+    <inkml:brush xml:id="br0">
+      <inkml:brushProperty name="width" value="0.3" units="cm"/>
+      <inkml:brushProperty name="height" value="0.6" units="cm"/>
+      <inkml:brushProperty name="color" value="#FFFC00"/>
+      <inkml:brushProperty name="tip" value="rectangle"/>
+      <inkml:brushProperty name="rasterOp" value="maskPen"/>
+      <inkml:brushProperty name="ignorePressure" value="1"/>
+    </inkml:brush>
+  </inkml:definitions>
+  <inkml:trace contextRef="#ctx0" brushRef="#br0">1 0,'7'1,"1"1,0-1,0 1,-1 1,1-1,-1 1,0 1,0-1,0 1,0 1,-1-1,12 11,-10-8,0-1,1 0,0 0,0-1,1 0,18 6,43 0,-55-10,0 1,0 1,23 7,-5 2,0-2,0 0,1-3,50 6,296-10,-199-6,-154 2,-1-1,1-1,48-13,77-32,-139 43,17-4,1 2,-1 1,1 2,0 1,39 1,-24 1,64-10,-35 0,105-2,79 15,-88 0,-133-2,-5 0</inkml:trace>
+</inkml:ink>
+</file>
+
+<file path=ppt/ink/ink7.xml><?xml version="1.0" encoding="utf-8"?>
+<inkml:ink xmlns:inkml="http://www.w3.org/2003/InkML">
+  <inkml:definitions>
+    <inkml:context xml:id="ctx0">
+      <inkml:inkSource xml:id="inkSrc0">
+        <inkml:traceFormat>
+          <inkml:channel name="X" type="integer" min="-2.14748E9" max="2.14748E9" units="cm"/>
+          <inkml:channel name="Y" type="integer" min="-2.14748E9" max="2.14748E9" units="cm"/>
+        </inkml:traceFormat>
+        <inkml:channelProperties>
+          <inkml:channelProperty channel="X" name="resolution" value="1000" units="1/cm"/>
+          <inkml:channelProperty channel="Y" name="resolution" value="1000" units="1/cm"/>
+        </inkml:channelProperties>
+      </inkml:inkSource>
+      <inkml:timestamp xml:id="ts0" timeString="2025-06-16T09:49:44.023"/>
+    </inkml:context>
+    <inkml:brush xml:id="br0">
+      <inkml:brushProperty name="width" value="0.3" units="cm"/>
+      <inkml:brushProperty name="height" value="0.6" units="cm"/>
+      <inkml:brushProperty name="color" value="#FFFC00"/>
+      <inkml:brushProperty name="tip" value="rectangle"/>
+      <inkml:brushProperty name="rasterOp" value="maskPen"/>
+      <inkml:brushProperty name="ignorePressure" value="1"/>
+    </inkml:brush>
+  </inkml:definitions>
+  <inkml:trace contextRef="#ctx0" brushRef="#br0">0 71,'18'1,"-1"1,0 0,0 2,0 0,18 7,23 5,40 6,0-4,170 7,386-24,-298-4,-294 1,69-13,30-1,-134 13,1-1,-1-2,53-17,-52 14,0 1,0 2,55-7,-65 12,0-1,0 0,-1-2,1 0,-1-1,0-1,0 0,22-13,-6 0</inkml:trace>
+</inkml:ink>
+</file>
+
+<file path=ppt/ink/ink8.xml><?xml version="1.0" encoding="utf-8"?>
+<inkml:ink xmlns:inkml="http://www.w3.org/2003/InkML">
+  <inkml:definitions>
+    <inkml:context xml:id="ctx0">
+      <inkml:inkSource xml:id="inkSrc0">
+        <inkml:traceFormat>
+          <inkml:channel name="X" type="integer" min="-2.14748E9" max="2.14748E9" units="cm"/>
+          <inkml:channel name="Y" type="integer" min="-2.14748E9" max="2.14748E9" units="cm"/>
+        </inkml:traceFormat>
+        <inkml:channelProperties>
+          <inkml:channelProperty channel="X" name="resolution" value="1000" units="1/cm"/>
+          <inkml:channelProperty channel="Y" name="resolution" value="1000" units="1/cm"/>
+        </inkml:channelProperties>
+      </inkml:inkSource>
+      <inkml:timestamp xml:id="ts0" timeString="2025-06-16T09:50:01.916"/>
+    </inkml:context>
+    <inkml:brush xml:id="br0">
+      <inkml:brushProperty name="width" value="0.3" units="cm"/>
+      <inkml:brushProperty name="height" value="0.6" units="cm"/>
+      <inkml:brushProperty name="color" value="#D9AEFF"/>
+      <inkml:brushProperty name="tip" value="rectangle"/>
+      <inkml:brushProperty name="rasterOp" value="maskPen"/>
+      <inkml:brushProperty name="ignorePressure" value="1"/>
+    </inkml:brush>
+  </inkml:definitions>
+  <inkml:trace contextRef="#ctx0" brushRef="#br0">6666 1,'-892'17,"356"-3,-1261-8,1002-9,-1806 3,2557 0</inkml:trace>
+</inkml:ink>
+</file>
+
 <file path=ppt/notesMasters/notesMaster1.xml><?xml version="1.0" encoding="utf-8"?>
 <p:notesMaster xmlns:a="http://schemas.openxmlformats.org/drawingml/2006/main" xmlns:r="http://schemas.openxmlformats.org/officeDocument/2006/relationships" xmlns:p="http://schemas.openxmlformats.org/presentationml/2006/main">
   <p:cSld>
@@ -293,7 +443,7 @@
           <a:p>
             <a:fld id="{CF66FA24-7EDD-44B6-B2ED-97DCF1071C98}" type="datetimeFigureOut">
               <a:rPr lang="en-IL" smtClean="0"/>
-              <a:t>05/06/2025</a:t>
+              <a:t>15/06/2025</a:t>
             </a:fld>
             <a:endParaRPr lang="en-IL"/>
           </a:p>
@@ -605,33 +755,6 @@
           <a:bodyPr/>
           <a:lstStyle/>
           <a:p>
-            <a:pPr algn="r" rtl="1"/>
-            <a:r>
-              <a:rPr lang="he-IL" dirty="0"/>
-              <a:t>הסברים:</a:t>
-            </a:r>
-          </a:p>
-          <a:p>
-            <a:pPr algn="r" rtl="1"/>
-            <a:r>
-              <a:rPr lang="he-IL" dirty="0"/>
-              <a:t>1. </a:t>
-            </a:r>
-            <a:r>
-              <a:rPr lang="en-GB" dirty="0"/>
-              <a:t>“Air Pollution Interactions with Weather and Climate Extremes”</a:t>
-            </a:r>
-            <a:r>
-              <a:rPr lang="he-IL" dirty="0"/>
-              <a:t> – </a:t>
-            </a:r>
-          </a:p>
-          <a:p>
-            <a:pPr algn="r" rtl="1"/>
-            <a:r>
-              <a:rPr lang="he-IL" dirty="0"/>
-              <a:t>2. </a:t>
-            </a:r>
             <a:endParaRPr lang="en-IL" dirty="0"/>
           </a:p>
         </p:txBody>
@@ -653,7 +776,7 @@
           <a:p>
             <a:fld id="{2223E0D9-5400-4D9B-AB0A-E6B83D748F25}" type="slidenum">
               <a:rPr lang="en-IL" smtClean="0"/>
-              <a:t>3</a:t>
+              <a:t>1</a:t>
             </a:fld>
             <a:endParaRPr lang="en-IL"/>
           </a:p>
@@ -662,7 +785,7 @@
     </p:spTree>
     <p:extLst>
       <p:ext uri="{BB962C8B-B14F-4D97-AF65-F5344CB8AC3E}">
-        <p14:creationId xmlns:p14="http://schemas.microsoft.com/office/powerpoint/2010/main" val="822910965"/>
+        <p14:creationId xmlns:p14="http://schemas.microsoft.com/office/powerpoint/2010/main" val="2273903722"/>
       </p:ext>
     </p:extLst>
   </p:cSld>
@@ -716,6 +839,33 @@
           <a:bodyPr/>
           <a:lstStyle/>
           <a:p>
+            <a:pPr algn="r" rtl="1"/>
+            <a:r>
+              <a:rPr lang="he-IL" dirty="0"/>
+              <a:t>הסברים:</a:t>
+            </a:r>
+          </a:p>
+          <a:p>
+            <a:pPr algn="r" rtl="1"/>
+            <a:r>
+              <a:rPr lang="he-IL" dirty="0"/>
+              <a:t>1. </a:t>
+            </a:r>
+            <a:r>
+              <a:rPr lang="en-GB" dirty="0"/>
+              <a:t>“Air Pollution Interactions with Weather and Climate Extremes”</a:t>
+            </a:r>
+            <a:r>
+              <a:rPr lang="he-IL" dirty="0"/>
+              <a:t> – </a:t>
+            </a:r>
+          </a:p>
+          <a:p>
+            <a:pPr algn="r" rtl="1"/>
+            <a:r>
+              <a:rPr lang="he-IL" dirty="0"/>
+              <a:t>2. </a:t>
+            </a:r>
             <a:endParaRPr lang="en-IL" dirty="0"/>
           </a:p>
         </p:txBody>
@@ -737,7 +887,7 @@
           <a:p>
             <a:fld id="{2223E0D9-5400-4D9B-AB0A-E6B83D748F25}" type="slidenum">
               <a:rPr lang="en-IL" smtClean="0"/>
-              <a:t>5</a:t>
+              <a:t>3</a:t>
             </a:fld>
             <a:endParaRPr lang="en-IL"/>
           </a:p>
@@ -746,7 +896,7 @@
     </p:spTree>
     <p:extLst>
       <p:ext uri="{BB962C8B-B14F-4D97-AF65-F5344CB8AC3E}">
-        <p14:creationId xmlns:p14="http://schemas.microsoft.com/office/powerpoint/2010/main" val="2901304763"/>
+        <p14:creationId xmlns:p14="http://schemas.microsoft.com/office/powerpoint/2010/main" val="822910965"/>
       </p:ext>
     </p:extLst>
   </p:cSld>
@@ -821,7 +971,7 @@
           <a:p>
             <a:fld id="{2223E0D9-5400-4D9B-AB0A-E6B83D748F25}" type="slidenum">
               <a:rPr lang="en-IL" smtClean="0"/>
-              <a:t>7</a:t>
+              <a:t>5</a:t>
             </a:fld>
             <a:endParaRPr lang="en-IL"/>
           </a:p>
@@ -830,7 +980,7 @@
     </p:spTree>
     <p:extLst>
       <p:ext uri="{BB962C8B-B14F-4D97-AF65-F5344CB8AC3E}">
-        <p14:creationId xmlns:p14="http://schemas.microsoft.com/office/powerpoint/2010/main" val="3175062125"/>
+        <p14:creationId xmlns:p14="http://schemas.microsoft.com/office/powerpoint/2010/main" val="2901304763"/>
       </p:ext>
     </p:extLst>
   </p:cSld>
@@ -905,7 +1055,7 @@
           <a:p>
             <a:fld id="{2223E0D9-5400-4D9B-AB0A-E6B83D748F25}" type="slidenum">
               <a:rPr lang="en-IL" smtClean="0"/>
-              <a:t>9</a:t>
+              <a:t>7</a:t>
             </a:fld>
             <a:endParaRPr lang="en-IL"/>
           </a:p>
@@ -914,7 +1064,7 @@
     </p:spTree>
     <p:extLst>
       <p:ext uri="{BB962C8B-B14F-4D97-AF65-F5344CB8AC3E}">
-        <p14:creationId xmlns:p14="http://schemas.microsoft.com/office/powerpoint/2010/main" val="2128145273"/>
+        <p14:creationId xmlns:p14="http://schemas.microsoft.com/office/powerpoint/2010/main" val="3175062125"/>
       </p:ext>
     </p:extLst>
   </p:cSld>
@@ -968,25 +1118,6 @@
           <a:bodyPr/>
           <a:lstStyle/>
           <a:p>
-            <a:r>
-              <a:rPr lang="en-GB" dirty="0"/>
-              <a:t>VISL achieves robust performance across diverse splits.</a:t>
-            </a:r>
-          </a:p>
-          <a:p>
-            <a:r>
-              <a:rPr lang="en-GB" dirty="0"/>
-              <a:t>Random Forest edges out in accuracy, but VISL is more generalizable and potentially scalable.</a:t>
-            </a:r>
-          </a:p>
-          <a:p>
-            <a:r>
-              <a:rPr lang="en-GB" dirty="0"/>
-              <a:t>Variance and std. dev. for VISL indicate **stable performance**, which is critical for deployment</a:t>
-            </a:r>
-            <a:endParaRPr lang="en-IL" dirty="0"/>
-          </a:p>
-          <a:p>
             <a:endParaRPr lang="en-IL" dirty="0"/>
           </a:p>
         </p:txBody>
@@ -1008,7 +1139,7 @@
           <a:p>
             <a:fld id="{2223E0D9-5400-4D9B-AB0A-E6B83D748F25}" type="slidenum">
               <a:rPr lang="en-IL" smtClean="0"/>
-              <a:t>11</a:t>
+              <a:t>9</a:t>
             </a:fld>
             <a:endParaRPr lang="en-IL"/>
           </a:p>
@@ -1017,7 +1148,7 @@
     </p:spTree>
     <p:extLst>
       <p:ext uri="{BB962C8B-B14F-4D97-AF65-F5344CB8AC3E}">
-        <p14:creationId xmlns:p14="http://schemas.microsoft.com/office/powerpoint/2010/main" val="52862680"/>
+        <p14:creationId xmlns:p14="http://schemas.microsoft.com/office/powerpoint/2010/main" val="2128145273"/>
       </p:ext>
     </p:extLst>
   </p:cSld>
@@ -1092,6 +1223,174 @@
           <a:p>
             <a:fld id="{2223E0D9-5400-4D9B-AB0A-E6B83D748F25}" type="slidenum">
               <a:rPr lang="en-IL" smtClean="0"/>
+              <a:t>10</a:t>
+            </a:fld>
+            <a:endParaRPr lang="en-IL"/>
+          </a:p>
+        </p:txBody>
+      </p:sp>
+    </p:spTree>
+    <p:extLst>
+      <p:ext uri="{BB962C8B-B14F-4D97-AF65-F5344CB8AC3E}">
+        <p14:creationId xmlns:p14="http://schemas.microsoft.com/office/powerpoint/2010/main" val="282212721"/>
+      </p:ext>
+    </p:extLst>
+  </p:cSld>
+  <p:clrMapOvr>
+    <a:masterClrMapping/>
+  </p:clrMapOvr>
+</p:notes>
+</file>
+
+<file path=ppt/notesSlides/notesSlide7.xml><?xml version="1.0" encoding="utf-8"?>
+<p:notes xmlns:a="http://schemas.openxmlformats.org/drawingml/2006/main" xmlns:r="http://schemas.openxmlformats.org/officeDocument/2006/relationships" xmlns:p="http://schemas.openxmlformats.org/presentationml/2006/main">
+  <p:cSld>
+    <p:spTree>
+      <p:nvGrpSpPr>
+        <p:cNvPr id="1" name=""/>
+        <p:cNvGrpSpPr/>
+        <p:nvPr/>
+      </p:nvGrpSpPr>
+      <p:grpSpPr>
+        <a:xfrm>
+          <a:off x="0" y="0"/>
+          <a:ext cx="0" cy="0"/>
+          <a:chOff x="0" y="0"/>
+          <a:chExt cx="0" cy="0"/>
+        </a:xfrm>
+      </p:grpSpPr>
+      <p:sp>
+        <p:nvSpPr>
+          <p:cNvPr id="2" name="Slide Image Placeholder 1"/>
+          <p:cNvSpPr>
+            <a:spLocks noGrp="1" noRot="1" noChangeAspect="1"/>
+          </p:cNvSpPr>
+          <p:nvPr>
+            <p:ph type="sldImg"/>
+          </p:nvPr>
+        </p:nvSpPr>
+        <p:spPr/>
+      </p:sp>
+      <p:sp>
+        <p:nvSpPr>
+          <p:cNvPr id="3" name="Notes Placeholder 2"/>
+          <p:cNvSpPr>
+            <a:spLocks noGrp="1"/>
+          </p:cNvSpPr>
+          <p:nvPr>
+            <p:ph type="body" idx="1"/>
+          </p:nvPr>
+        </p:nvSpPr>
+        <p:spPr/>
+        <p:txBody>
+          <a:bodyPr/>
+          <a:lstStyle/>
+          <a:p>
+            <a:endParaRPr lang="en-IL" dirty="0"/>
+          </a:p>
+        </p:txBody>
+      </p:sp>
+      <p:sp>
+        <p:nvSpPr>
+          <p:cNvPr id="4" name="Slide Number Placeholder 3"/>
+          <p:cNvSpPr>
+            <a:spLocks noGrp="1"/>
+          </p:cNvSpPr>
+          <p:nvPr>
+            <p:ph type="sldNum" sz="quarter" idx="5"/>
+          </p:nvPr>
+        </p:nvSpPr>
+        <p:spPr/>
+        <p:txBody>
+          <a:bodyPr/>
+          <a:lstStyle/>
+          <a:p>
+            <a:fld id="{2223E0D9-5400-4D9B-AB0A-E6B83D748F25}" type="slidenum">
+              <a:rPr lang="en-IL" smtClean="0"/>
+              <a:t>11</a:t>
+            </a:fld>
+            <a:endParaRPr lang="en-IL"/>
+          </a:p>
+        </p:txBody>
+      </p:sp>
+    </p:spTree>
+    <p:extLst>
+      <p:ext uri="{BB962C8B-B14F-4D97-AF65-F5344CB8AC3E}">
+        <p14:creationId xmlns:p14="http://schemas.microsoft.com/office/powerpoint/2010/main" val="52862680"/>
+      </p:ext>
+    </p:extLst>
+  </p:cSld>
+  <p:clrMapOvr>
+    <a:masterClrMapping/>
+  </p:clrMapOvr>
+</p:notes>
+</file>
+
+<file path=ppt/notesSlides/notesSlide8.xml><?xml version="1.0" encoding="utf-8"?>
+<p:notes xmlns:a="http://schemas.openxmlformats.org/drawingml/2006/main" xmlns:r="http://schemas.openxmlformats.org/officeDocument/2006/relationships" xmlns:p="http://schemas.openxmlformats.org/presentationml/2006/main">
+  <p:cSld>
+    <p:spTree>
+      <p:nvGrpSpPr>
+        <p:cNvPr id="1" name=""/>
+        <p:cNvGrpSpPr/>
+        <p:nvPr/>
+      </p:nvGrpSpPr>
+      <p:grpSpPr>
+        <a:xfrm>
+          <a:off x="0" y="0"/>
+          <a:ext cx="0" cy="0"/>
+          <a:chOff x="0" y="0"/>
+          <a:chExt cx="0" cy="0"/>
+        </a:xfrm>
+      </p:grpSpPr>
+      <p:sp>
+        <p:nvSpPr>
+          <p:cNvPr id="2" name="Slide Image Placeholder 1"/>
+          <p:cNvSpPr>
+            <a:spLocks noGrp="1" noRot="1" noChangeAspect="1"/>
+          </p:cNvSpPr>
+          <p:nvPr>
+            <p:ph type="sldImg"/>
+          </p:nvPr>
+        </p:nvSpPr>
+        <p:spPr/>
+      </p:sp>
+      <p:sp>
+        <p:nvSpPr>
+          <p:cNvPr id="3" name="Notes Placeholder 2"/>
+          <p:cNvSpPr>
+            <a:spLocks noGrp="1"/>
+          </p:cNvSpPr>
+          <p:nvPr>
+            <p:ph type="body" idx="1"/>
+          </p:nvPr>
+        </p:nvSpPr>
+        <p:spPr/>
+        <p:txBody>
+          <a:bodyPr/>
+          <a:lstStyle/>
+          <a:p>
+            <a:endParaRPr lang="en-IL" dirty="0"/>
+          </a:p>
+        </p:txBody>
+      </p:sp>
+      <p:sp>
+        <p:nvSpPr>
+          <p:cNvPr id="4" name="Slide Number Placeholder 3"/>
+          <p:cNvSpPr>
+            <a:spLocks noGrp="1"/>
+          </p:cNvSpPr>
+          <p:nvPr>
+            <p:ph type="sldNum" sz="quarter" idx="5"/>
+          </p:nvPr>
+        </p:nvSpPr>
+        <p:spPr/>
+        <p:txBody>
+          <a:bodyPr/>
+          <a:lstStyle/>
+          <a:p>
+            <a:fld id="{2223E0D9-5400-4D9B-AB0A-E6B83D748F25}" type="slidenum">
+              <a:rPr lang="en-IL" smtClean="0"/>
               <a:t>12</a:t>
             </a:fld>
             <a:endParaRPr lang="en-IL"/>
@@ -1111,7 +1410,7 @@
 </p:notes>
 </file>
 
-<file path=ppt/notesSlides/notesSlide7.xml><?xml version="1.0" encoding="utf-8"?>
+<file path=ppt/notesSlides/notesSlide9.xml><?xml version="1.0" encoding="utf-8"?>
 <p:notes xmlns:a="http://schemas.openxmlformats.org/drawingml/2006/main" xmlns:r="http://schemas.openxmlformats.org/officeDocument/2006/relationships" xmlns:p="http://schemas.openxmlformats.org/presentationml/2006/main">
   <p:cSld>
     <p:spTree>
@@ -1530,7 +1829,7 @@
           <a:p>
             <a:fld id="{6444479B-705B-4489-957E-7E8A228BDFA0}" type="datetime1">
               <a:rPr lang="en-US" smtClean="0"/>
-              <a:t>6/5/2025</a:t>
+              <a:t>6/15/2025</a:t>
             </a:fld>
             <a:endParaRPr lang="en-US"/>
           </a:p>
@@ -2618,7 +2917,7 @@
           <a:p>
             <a:fld id="{7DA38F49-B3E2-4BF0-BEC7-C30D34ABBB8D}" type="datetime1">
               <a:rPr lang="en-US" smtClean="0"/>
-              <a:t>6/5/2025</a:t>
+              <a:t>6/15/2025</a:t>
             </a:fld>
             <a:endParaRPr lang="en-US"/>
           </a:p>
@@ -3599,7 +3898,7 @@
           <a:p>
             <a:fld id="{7DA38F49-B3E2-4BF0-BEC7-C30D34ABBB8D}" type="datetime1">
               <a:rPr lang="en-US" smtClean="0"/>
-              <a:t>6/5/2025</a:t>
+              <a:t>6/15/2025</a:t>
             </a:fld>
             <a:endParaRPr lang="en-US"/>
           </a:p>
@@ -4734,7 +5033,7 @@
           <a:p>
             <a:fld id="{7DA38F49-B3E2-4BF0-BEC7-C30D34ABBB8D}" type="datetime1">
               <a:rPr lang="en-US" smtClean="0"/>
-              <a:t>6/5/2025</a:t>
+              <a:t>6/15/2025</a:t>
             </a:fld>
             <a:endParaRPr lang="en-US"/>
           </a:p>
@@ -5768,7 +6067,7 @@
           <a:p>
             <a:fld id="{7DA38F49-B3E2-4BF0-BEC7-C30D34ABBB8D}" type="datetime1">
               <a:rPr lang="en-US" smtClean="0"/>
-              <a:t>6/5/2025</a:t>
+              <a:t>6/15/2025</a:t>
             </a:fld>
             <a:endParaRPr lang="en-US"/>
           </a:p>
@@ -6429,7 +6728,7 @@
           <a:p>
             <a:fld id="{7DA38F49-B3E2-4BF0-BEC7-C30D34ABBB8D}" type="datetime1">
               <a:rPr lang="en-US" smtClean="0"/>
-              <a:t>6/5/2025</a:t>
+              <a:t>6/15/2025</a:t>
             </a:fld>
             <a:endParaRPr lang="en-US"/>
           </a:p>
@@ -7291,7 +7590,7 @@
           <a:p>
             <a:fld id="{7DA38F49-B3E2-4BF0-BEC7-C30D34ABBB8D}" type="datetime1">
               <a:rPr lang="en-US" smtClean="0"/>
-              <a:t>6/5/2025</a:t>
+              <a:t>6/15/2025</a:t>
             </a:fld>
             <a:endParaRPr lang="en-US"/>
           </a:p>
@@ -7482,7 +7781,7 @@
           <a:p>
             <a:fld id="{C07B66AD-7C08-490A-ADA4-B47E10FB2407}" type="datetime1">
               <a:rPr lang="en-US" smtClean="0"/>
-              <a:t>6/5/2025</a:t>
+              <a:t>6/15/2025</a:t>
             </a:fld>
             <a:endParaRPr lang="en-US"/>
           </a:p>
@@ -8454,7 +8753,7 @@
           <a:p>
             <a:fld id="{05B95027-4255-49E7-9841-CD21BCC99996}" type="datetime1">
               <a:rPr lang="en-US" smtClean="0"/>
-              <a:t>6/5/2025</a:t>
+              <a:t>6/15/2025</a:t>
             </a:fld>
             <a:endParaRPr lang="en-US"/>
           </a:p>
@@ -8665,7 +8964,7 @@
           <a:p>
             <a:fld id="{9F89F774-3FA6-43B8-9241-99959C8FD463}" type="datetime1">
               <a:rPr lang="en-US" smtClean="0"/>
-              <a:t>6/5/2025</a:t>
+              <a:t>6/15/2025</a:t>
             </a:fld>
             <a:endParaRPr lang="en-US"/>
           </a:p>
@@ -9699,7 +9998,7 @@
           <a:p>
             <a:fld id="{F9504452-5DCC-4FE2-A5C9-8A5EF6714D65}" type="datetime1">
               <a:rPr lang="en-US" smtClean="0"/>
-              <a:t>6/5/2025</a:t>
+              <a:t>6/15/2025</a:t>
             </a:fld>
             <a:endParaRPr lang="en-US"/>
           </a:p>
@@ -9971,7 +10270,7 @@
           <a:p>
             <a:fld id="{E579ABC2-0180-4F3A-A895-A85BC724D472}" type="datetime1">
               <a:rPr lang="en-US" smtClean="0"/>
-              <a:t>6/5/2025</a:t>
+              <a:t>6/15/2025</a:t>
             </a:fld>
             <a:endParaRPr lang="en-US"/>
           </a:p>
@@ -10381,7 +10680,7 @@
           <a:p>
             <a:fld id="{6AEEA9BA-4E8F-439E-BEA4-91FBA01E3F5F}" type="datetime1">
               <a:rPr lang="en-US" smtClean="0"/>
-              <a:t>6/5/2025</a:t>
+              <a:t>6/15/2025</a:t>
             </a:fld>
             <a:endParaRPr lang="en-US"/>
           </a:p>
@@ -10508,7 +10807,7 @@
           <a:p>
             <a:fld id="{BE15BF18-0007-481C-AA29-413124BC3EE7}" type="datetime1">
               <a:rPr lang="en-US" smtClean="0"/>
-              <a:t>6/5/2025</a:t>
+              <a:t>6/15/2025</a:t>
             </a:fld>
             <a:endParaRPr lang="en-US"/>
           </a:p>
@@ -10603,7 +10902,7 @@
           <a:p>
             <a:fld id="{09BE9870-3748-43AD-B547-02A075CB4A1D}" type="datetime1">
               <a:rPr lang="en-US" smtClean="0"/>
-              <a:t>6/5/2025</a:t>
+              <a:t>6/15/2025</a:t>
             </a:fld>
             <a:endParaRPr lang="en-US"/>
           </a:p>
@@ -11684,7 +11983,7 @@
           <a:p>
             <a:fld id="{558E7897-33C5-4F1A-9307-D068E37F3DC7}" type="datetime1">
               <a:rPr lang="en-US" smtClean="0"/>
-              <a:t>6/5/2025</a:t>
+              <a:t>6/15/2025</a:t>
             </a:fld>
             <a:endParaRPr lang="en-US"/>
           </a:p>
@@ -12792,7 +13091,7 @@
           <a:p>
             <a:fld id="{82E171BA-CC09-47C8-A6DF-F5C5CB59CEEC}" type="datetime1">
               <a:rPr lang="en-US" smtClean="0"/>
-              <a:t>6/5/2025</a:t>
+              <a:t>6/15/2025</a:t>
             </a:fld>
             <a:endParaRPr lang="en-US"/>
           </a:p>
@@ -13789,7 +14088,7 @@
           <a:p>
             <a:fld id="{7DA38F49-B3E2-4BF0-BEC7-C30D34ABBB8D}" type="datetime1">
               <a:rPr lang="en-US" smtClean="0"/>
-              <a:t>6/5/2025</a:t>
+              <a:t>6/15/2025</a:t>
             </a:fld>
             <a:endParaRPr lang="en-US"/>
           </a:p>
@@ -14418,7 +14717,7 @@
               <a:avLst/>
             </a:prstGeom>
             <a:blipFill>
-              <a:blip r:embed="rId2">
+              <a:blip r:embed="rId3">
                 <a:duotone>
                   <a:schemeClr val="dk2">
                     <a:shade val="69000"/>
@@ -14567,7 +14866,7 @@
           <p:nvPr/>
         </p:nvPicPr>
         <p:blipFill>
-          <a:blip r:embed="rId3">
+          <a:blip r:embed="rId4">
             <a:duotone>
               <a:prstClr val="black"/>
               <a:schemeClr val="accent5">
@@ -14894,8 +15193,8 @@
             </p:nvSpPr>
             <p:spPr>
               <a:xfrm>
-                <a:off x="635124" y="2487865"/>
-                <a:ext cx="10921752" cy="3211477"/>
+                <a:off x="398981" y="2487865"/>
+                <a:ext cx="11394038" cy="3211477"/>
               </a:xfrm>
             </p:spPr>
             <p:txBody>
@@ -14920,7 +15219,7 @@
                 </a:r>
                 <a:r>
                   <a:rPr lang="en-GB" sz="1600" dirty="0"/>
-                  <a:t> – Measures average absolute prediction error (↓ better) - </a:t>
+                  <a:t> - Measures average absolute prediction error (↓ better) - </a:t>
                 </a:r>
                 <a14:m>
                   <m:oMath xmlns:m="http://schemas.openxmlformats.org/officeDocument/2006/math">
@@ -14987,10 +15286,10 @@
                           <m:t>=</m:t>
                         </m:r>
                         <m:r>
-                          <a:rPr lang="en-GB" sz="1600" i="1">
+                          <a:rPr lang="en-GB" sz="1600" b="0" i="1" smtClean="0">
                             <a:latin typeface="Cambria Math" panose="02040503050406030204" pitchFamily="18" charset="0"/>
                           </a:rPr>
-                          <m:t>1</m:t>
+                          <m:t>0</m:t>
                         </m:r>
                       </m:sub>
                       <m:sup>
@@ -14999,6 +15298,12 @@
                             <a:latin typeface="Cambria Math" panose="02040503050406030204" pitchFamily="18" charset="0"/>
                           </a:rPr>
                           <m:t>𝑛</m:t>
+                        </m:r>
+                        <m:r>
+                          <a:rPr lang="en-GB" sz="1600" b="0" i="1" smtClean="0">
+                            <a:latin typeface="Cambria Math" panose="02040503050406030204" pitchFamily="18" charset="0"/>
+                          </a:rPr>
+                          <m:t>−1</m:t>
                         </m:r>
                       </m:sup>
                       <m:e>
@@ -15099,7 +15404,7 @@
                 </a:r>
                 <a:r>
                   <a:rPr lang="en-GB" sz="1600" dirty="0"/>
-                  <a:t> – Proportion of variance explained by the model (↑ better) - </a:t>
+                  <a:t> - Proportion of variance explained by the model (↑ better) - </a:t>
                 </a:r>
                 <a14:m>
                   <m:oMath xmlns:m="http://schemas.openxmlformats.org/officeDocument/2006/math">
@@ -15132,19 +15437,7 @@
                       <a:rPr lang="en-GB" sz="1600" b="0" i="1" smtClean="0">
                         <a:latin typeface="Cambria Math" panose="02040503050406030204" pitchFamily="18" charset="0"/>
                       </a:rPr>
-                      <m:t>=</m:t>
-                    </m:r>
-                    <m:r>
-                      <a:rPr lang="en-GB" sz="1600" b="0" i="1" smtClean="0">
-                        <a:latin typeface="Cambria Math" panose="02040503050406030204" pitchFamily="18" charset="0"/>
-                      </a:rPr>
-                      <m:t>1</m:t>
-                    </m:r>
-                    <m:r>
-                      <a:rPr lang="en-GB" sz="1600" b="0" i="1" smtClean="0">
-                        <a:latin typeface="Cambria Math" panose="02040503050406030204" pitchFamily="18" charset="0"/>
-                      </a:rPr>
-                      <m:t>−</m:t>
+                      <m:t>=1−</m:t>
                     </m:r>
                     <m:f>
                       <m:fPr>
@@ -15181,18 +15474,24 @@
                               <m:t>=</m:t>
                             </m:r>
                             <m:r>
-                              <a:rPr lang="en-GB" sz="1600" i="1">
+                              <a:rPr lang="en-GB" sz="1600" b="0" i="1" smtClean="0">
                                 <a:latin typeface="Cambria Math" panose="02040503050406030204" pitchFamily="18" charset="0"/>
                               </a:rPr>
-                              <m:t>1</m:t>
+                              <m:t>0</m:t>
                             </m:r>
                           </m:sub>
                           <m:sup>
                             <m:r>
-                              <a:rPr lang="en-GB" sz="1600" i="1">
+                              <a:rPr lang="en-GB" sz="1600" i="1" smtClean="0">
                                 <a:latin typeface="Cambria Math" panose="02040503050406030204" pitchFamily="18" charset="0"/>
                               </a:rPr>
                               <m:t>𝑛</m:t>
+                            </m:r>
+                            <m:r>
+                              <a:rPr lang="en-GB" sz="1600" b="0" i="1" smtClean="0">
+                                <a:latin typeface="Cambria Math" panose="02040503050406030204" pitchFamily="18" charset="0"/>
+                              </a:rPr>
+                              <m:t>−1</m:t>
                             </m:r>
                           </m:sup>
                           <m:e>
@@ -15330,10 +15629,10 @@
                               <m:t>=</m:t>
                             </m:r>
                             <m:r>
-                              <a:rPr lang="en-GB" sz="1600" i="1">
+                              <a:rPr lang="en-GB" sz="1600" b="0" i="1" smtClean="0">
                                 <a:latin typeface="Cambria Math" panose="02040503050406030204" pitchFamily="18" charset="0"/>
                               </a:rPr>
-                              <m:t>1</m:t>
+                              <m:t>0</m:t>
                             </m:r>
                           </m:sub>
                           <m:sup>
@@ -15342,6 +15641,12 @@
                                 <a:latin typeface="Cambria Math" panose="02040503050406030204" pitchFamily="18" charset="0"/>
                               </a:rPr>
                               <m:t>𝑛</m:t>
+                            </m:r>
+                            <m:r>
+                              <a:rPr lang="en-GB" sz="1600" b="0" i="1" smtClean="0">
+                                <a:latin typeface="Cambria Math" panose="02040503050406030204" pitchFamily="18" charset="0"/>
+                              </a:rPr>
+                              <m:t>−1</m:t>
                             </m:r>
                           </m:sup>
                           <m:e>
@@ -15440,42 +15745,32 @@
               </a:p>
               <a:p>
                 <a:r>
-                  <a:rPr lang="en-GB" sz="1600" dirty="0"/>
-                  <a:t>  </a:t>
-                </a:r>
-                <a:r>
                   <a:rPr lang="en-GB" sz="1600" b="1" dirty="0"/>
-                  <a:t>EVS</a:t>
+                  <a:t>MAPE</a:t>
                 </a:r>
                 <a:r>
                   <a:rPr lang="en-GB" sz="1600" dirty="0"/>
-                  <a:t> – How much of the target variance is captured (↑ better) - </a:t>
+                  <a:t> - Mean absolute percentage error, normalized by target magnitude (↓ better)- </a:t>
                 </a:r>
                 <a14:m>
                   <m:oMath xmlns:m="http://schemas.openxmlformats.org/officeDocument/2006/math">
                     <m:r>
+                      <a:rPr lang="en-US" sz="1600" b="0" i="1" smtClean="0">
+                        <a:latin typeface="Cambria Math" panose="02040503050406030204" pitchFamily="18" charset="0"/>
+                      </a:rPr>
+                      <m:t>𝑀</m:t>
+                    </m:r>
+                    <m:r>
                       <a:rPr lang="en-GB" sz="1600" b="0" i="1" smtClean="0">
                         <a:latin typeface="Cambria Math" panose="02040503050406030204" pitchFamily="18" charset="0"/>
                       </a:rPr>
-                      <m:t>𝐸𝑉𝑆</m:t>
+                      <m:t>𝐴𝑃𝐸</m:t>
                     </m:r>
                     <m:r>
                       <a:rPr lang="en-GB" sz="1600" b="0" i="1" smtClean="0">
                         <a:latin typeface="Cambria Math" panose="02040503050406030204" pitchFamily="18" charset="0"/>
                       </a:rPr>
                       <m:t>=</m:t>
-                    </m:r>
-                    <m:r>
-                      <a:rPr lang="en-GB" sz="1600" b="0" i="1" smtClean="0">
-                        <a:latin typeface="Cambria Math" panose="02040503050406030204" pitchFamily="18" charset="0"/>
-                      </a:rPr>
-                      <m:t>1</m:t>
-                    </m:r>
-                    <m:r>
-                      <a:rPr lang="en-GB" sz="1600" b="0" i="1" smtClean="0">
-                        <a:latin typeface="Cambria Math" panose="02040503050406030204" pitchFamily="18" charset="0"/>
-                      </a:rPr>
-                      <m:t>−</m:t>
                     </m:r>
                     <m:f>
                       <m:fPr>
@@ -15490,49 +15785,7 @@
                           <a:rPr lang="en-GB" sz="1600" b="0" i="1" smtClean="0">
                             <a:latin typeface="Cambria Math" panose="02040503050406030204" pitchFamily="18" charset="0"/>
                           </a:rPr>
-                          <m:t>𝑉𝑎𝑟</m:t>
-                        </m:r>
-                        <m:r>
-                          <a:rPr lang="en-GB" sz="1600" b="0" i="1" smtClean="0">
-                            <a:latin typeface="Cambria Math" panose="02040503050406030204" pitchFamily="18" charset="0"/>
-                          </a:rPr>
-                          <m:t>(</m:t>
-                        </m:r>
-                        <m:r>
-                          <a:rPr lang="en-GB" sz="1600" b="0" i="1" smtClean="0">
-                            <a:latin typeface="Cambria Math" panose="02040503050406030204" pitchFamily="18" charset="0"/>
-                          </a:rPr>
-                          <m:t>𝑦</m:t>
-                        </m:r>
-                        <m:r>
-                          <a:rPr lang="en-GB" sz="1600" b="0" i="1" smtClean="0">
-                            <a:latin typeface="Cambria Math" panose="02040503050406030204" pitchFamily="18" charset="0"/>
-                          </a:rPr>
-                          <m:t>−</m:t>
-                        </m:r>
-                        <m:acc>
-                          <m:accPr>
-                            <m:chr m:val="̂"/>
-                            <m:ctrlPr>
-                              <a:rPr lang="en-GB" sz="1600" b="0" i="1" smtClean="0">
-                                <a:latin typeface="Cambria Math" panose="02040503050406030204" pitchFamily="18" charset="0"/>
-                              </a:rPr>
-                            </m:ctrlPr>
-                          </m:accPr>
-                          <m:e>
-                            <m:r>
-                              <a:rPr lang="en-GB" sz="1600" b="0" i="1" smtClean="0">
-                                <a:latin typeface="Cambria Math" panose="02040503050406030204" pitchFamily="18" charset="0"/>
-                              </a:rPr>
-                              <m:t>𝑦</m:t>
-                            </m:r>
-                          </m:e>
-                        </m:acc>
-                        <m:r>
-                          <a:rPr lang="en-GB" sz="1600" b="0" i="1" smtClean="0">
-                            <a:latin typeface="Cambria Math" panose="02040503050406030204" pitchFamily="18" charset="0"/>
-                          </a:rPr>
-                          <m:t>)</m:t>
+                          <m:t>1</m:t>
                         </m:r>
                       </m:num>
                       <m:den>
@@ -15540,28 +15793,243 @@
                           <a:rPr lang="en-GB" sz="1600" b="0" i="1" smtClean="0">
                             <a:latin typeface="Cambria Math" panose="02040503050406030204" pitchFamily="18" charset="0"/>
                           </a:rPr>
-                          <m:t>𝑉𝑎𝑟</m:t>
+                          <m:t>𝑛</m:t>
+                        </m:r>
+                      </m:den>
+                    </m:f>
+                    <m:nary>
+                      <m:naryPr>
+                        <m:chr m:val="∑"/>
+                        <m:ctrlPr>
+                          <a:rPr lang="en-GB" sz="1600" b="0" i="1" smtClean="0">
+                            <a:latin typeface="Cambria Math" panose="02040503050406030204" pitchFamily="18" charset="0"/>
+                          </a:rPr>
+                        </m:ctrlPr>
+                      </m:naryPr>
+                      <m:sub>
+                        <m:r>
+                          <m:rPr>
+                            <m:brk m:alnAt="23"/>
+                          </m:rPr>
+                          <a:rPr lang="en-GB" sz="1600" b="0" i="1" smtClean="0">
+                            <a:latin typeface="Cambria Math" panose="02040503050406030204" pitchFamily="18" charset="0"/>
+                          </a:rPr>
+                          <m:t>𝑖</m:t>
                         </m:r>
                         <m:r>
                           <a:rPr lang="en-GB" sz="1600" b="0" i="1" smtClean="0">
                             <a:latin typeface="Cambria Math" panose="02040503050406030204" pitchFamily="18" charset="0"/>
                           </a:rPr>
-                          <m:t>(</m:t>
+                          <m:t>=0</m:t>
+                        </m:r>
+                      </m:sub>
+                      <m:sup>
+                        <m:r>
+                          <a:rPr lang="en-GB" sz="1600" b="0" i="1" smtClean="0">
+                            <a:latin typeface="Cambria Math" panose="02040503050406030204" pitchFamily="18" charset="0"/>
+                          </a:rPr>
+                          <m:t>𝑛</m:t>
                         </m:r>
                         <m:r>
                           <a:rPr lang="en-GB" sz="1600" b="0" i="1" smtClean="0">
                             <a:latin typeface="Cambria Math" panose="02040503050406030204" pitchFamily="18" charset="0"/>
                           </a:rPr>
-                          <m:t>𝑦</m:t>
+                          <m:t>−1</m:t>
                         </m:r>
+                      </m:sup>
+                      <m:e>
+                        <m:f>
+                          <m:fPr>
+                            <m:ctrlPr>
+                              <a:rPr lang="en-GB" sz="1600" b="0" i="1" smtClean="0">
+                                <a:latin typeface="Cambria Math" panose="02040503050406030204" pitchFamily="18" charset="0"/>
+                              </a:rPr>
+                            </m:ctrlPr>
+                          </m:fPr>
+                          <m:num>
+                            <m:d>
+                              <m:dPr>
+                                <m:begChr m:val="|"/>
+                                <m:endChr m:val="|"/>
+                                <m:ctrlPr>
+                                  <a:rPr lang="en-GB" sz="1600" b="0" i="1" smtClean="0">
+                                    <a:latin typeface="Cambria Math" panose="02040503050406030204" pitchFamily="18" charset="0"/>
+                                  </a:rPr>
+                                </m:ctrlPr>
+                              </m:dPr>
+                              <m:e>
+                                <m:sSub>
+                                  <m:sSubPr>
+                                    <m:ctrlPr>
+                                      <a:rPr lang="en-GB" sz="1600" b="0" i="1" smtClean="0">
+                                        <a:latin typeface="Cambria Math" panose="02040503050406030204" pitchFamily="18" charset="0"/>
+                                      </a:rPr>
+                                    </m:ctrlPr>
+                                  </m:sSubPr>
+                                  <m:e>
+                                    <m:r>
+                                      <a:rPr lang="en-GB" sz="1600" b="0" i="1" smtClean="0">
+                                        <a:latin typeface="Cambria Math" panose="02040503050406030204" pitchFamily="18" charset="0"/>
+                                      </a:rPr>
+                                      <m:t>𝑦</m:t>
+                                    </m:r>
+                                  </m:e>
+                                  <m:sub>
+                                    <m:r>
+                                      <a:rPr lang="en-GB" sz="1600" b="0" i="1" smtClean="0">
+                                        <a:latin typeface="Cambria Math" panose="02040503050406030204" pitchFamily="18" charset="0"/>
+                                      </a:rPr>
+                                      <m:t>𝑖</m:t>
+                                    </m:r>
+                                  </m:sub>
+                                </m:sSub>
+                                <m:r>
+                                  <a:rPr lang="en-GB" sz="1600" b="0" i="1" smtClean="0">
+                                    <a:latin typeface="Cambria Math" panose="02040503050406030204" pitchFamily="18" charset="0"/>
+                                  </a:rPr>
+                                  <m:t>−</m:t>
+                                </m:r>
+                                <m:acc>
+                                  <m:accPr>
+                                    <m:chr m:val="̂"/>
+                                    <m:ctrlPr>
+                                      <a:rPr lang="en-GB" sz="1600" i="1">
+                                        <a:latin typeface="Cambria Math" panose="02040503050406030204" pitchFamily="18" charset="0"/>
+                                      </a:rPr>
+                                    </m:ctrlPr>
+                                  </m:accPr>
+                                  <m:e>
+                                    <m:sSub>
+                                      <m:sSubPr>
+                                        <m:ctrlPr>
+                                          <a:rPr lang="en-GB" sz="1600" i="1">
+                                            <a:latin typeface="Cambria Math" panose="02040503050406030204" pitchFamily="18" charset="0"/>
+                                          </a:rPr>
+                                        </m:ctrlPr>
+                                      </m:sSubPr>
+                                      <m:e>
+                                        <m:r>
+                                          <a:rPr lang="en-GB" sz="1600" i="1">
+                                            <a:latin typeface="Cambria Math" panose="02040503050406030204" pitchFamily="18" charset="0"/>
+                                          </a:rPr>
+                                          <m:t>𝑦</m:t>
+                                        </m:r>
+                                      </m:e>
+                                      <m:sub>
+                                        <m:r>
+                                          <a:rPr lang="en-GB" sz="1600" i="1">
+                                            <a:latin typeface="Cambria Math" panose="02040503050406030204" pitchFamily="18" charset="0"/>
+                                          </a:rPr>
+                                          <m:t>𝑖</m:t>
+                                        </m:r>
+                                      </m:sub>
+                                    </m:sSub>
+                                  </m:e>
+                                </m:acc>
+                              </m:e>
+                            </m:d>
+                          </m:num>
+                          <m:den>
+                            <m:func>
+                              <m:funcPr>
+                                <m:ctrlPr>
+                                  <a:rPr lang="en-GB" sz="1600" b="0" i="1" smtClean="0">
+                                    <a:latin typeface="Cambria Math" panose="02040503050406030204" pitchFamily="18" charset="0"/>
+                                  </a:rPr>
+                                </m:ctrlPr>
+                              </m:funcPr>
+                              <m:fName>
+                                <m:r>
+                                  <m:rPr>
+                                    <m:sty m:val="p"/>
+                                  </m:rPr>
+                                  <a:rPr lang="en-GB" sz="1600" b="0" i="0" smtClean="0">
+                                    <a:latin typeface="Cambria Math" panose="02040503050406030204" pitchFamily="18" charset="0"/>
+                                  </a:rPr>
+                                  <m:t>max</m:t>
+                                </m:r>
+                              </m:fName>
+                              <m:e>
+                                <m:d>
+                                  <m:dPr>
+                                    <m:ctrlPr>
+                                      <a:rPr lang="en-GB" sz="1600" b="0" i="1" smtClean="0">
+                                        <a:latin typeface="Cambria Math" panose="02040503050406030204" pitchFamily="18" charset="0"/>
+                                      </a:rPr>
+                                    </m:ctrlPr>
+                                  </m:dPr>
+                                  <m:e>
+                                    <m:r>
+                                      <a:rPr lang="en-GB" sz="1600" b="0" i="1" smtClean="0">
+                                        <a:latin typeface="Cambria Math" panose="02040503050406030204" pitchFamily="18" charset="0"/>
+                                        <a:ea typeface="Cambria Math" panose="02040503050406030204" pitchFamily="18" charset="0"/>
+                                      </a:rPr>
+                                      <m:t>𝜀</m:t>
+                                    </m:r>
+                                    <m:r>
+                                      <a:rPr lang="en-GB" sz="1600" b="0" i="1" smtClean="0">
+                                        <a:latin typeface="Cambria Math" panose="02040503050406030204" pitchFamily="18" charset="0"/>
+                                        <a:ea typeface="Cambria Math" panose="02040503050406030204" pitchFamily="18" charset="0"/>
+                                      </a:rPr>
+                                      <m:t>, </m:t>
+                                    </m:r>
+                                    <m:d>
+                                      <m:dPr>
+                                        <m:begChr m:val="|"/>
+                                        <m:endChr m:val="|"/>
+                                        <m:ctrlPr>
+                                          <a:rPr lang="en-GB" sz="1600" b="0" i="1" smtClean="0">
+                                            <a:latin typeface="Cambria Math" panose="02040503050406030204" pitchFamily="18" charset="0"/>
+                                            <a:ea typeface="Cambria Math" panose="02040503050406030204" pitchFamily="18" charset="0"/>
+                                          </a:rPr>
+                                        </m:ctrlPr>
+                                      </m:dPr>
+                                      <m:e>
+                                        <m:sSub>
+                                          <m:sSubPr>
+                                            <m:ctrlPr>
+                                              <a:rPr lang="en-GB" sz="1600" b="0" i="1" smtClean="0">
+                                                <a:latin typeface="Cambria Math" panose="02040503050406030204" pitchFamily="18" charset="0"/>
+                                                <a:ea typeface="Cambria Math" panose="02040503050406030204" pitchFamily="18" charset="0"/>
+                                              </a:rPr>
+                                            </m:ctrlPr>
+                                          </m:sSubPr>
+                                          <m:e>
+                                            <m:r>
+                                              <a:rPr lang="en-GB" sz="1600" b="0" i="1" smtClean="0">
+                                                <a:latin typeface="Cambria Math" panose="02040503050406030204" pitchFamily="18" charset="0"/>
+                                                <a:ea typeface="Cambria Math" panose="02040503050406030204" pitchFamily="18" charset="0"/>
+                                              </a:rPr>
+                                              <m:t>𝑦</m:t>
+                                            </m:r>
+                                          </m:e>
+                                          <m:sub>
+                                            <m:r>
+                                              <a:rPr lang="en-GB" sz="1600" b="0" i="1" smtClean="0">
+                                                <a:latin typeface="Cambria Math" panose="02040503050406030204" pitchFamily="18" charset="0"/>
+                                                <a:ea typeface="Cambria Math" panose="02040503050406030204" pitchFamily="18" charset="0"/>
+                                              </a:rPr>
+                                              <m:t>𝑖</m:t>
+                                            </m:r>
+                                          </m:sub>
+                                        </m:sSub>
+                                      </m:e>
+                                    </m:d>
+                                  </m:e>
+                                </m:d>
+                              </m:e>
+                            </m:func>
+                          </m:den>
+                        </m:f>
                         <m:r>
                           <a:rPr lang="en-GB" sz="1600" b="0" i="1" smtClean="0">
                             <a:latin typeface="Cambria Math" panose="02040503050406030204" pitchFamily="18" charset="0"/>
+                            <a:ea typeface="Cambria Math" panose="02040503050406030204" pitchFamily="18" charset="0"/>
                           </a:rPr>
-                          <m:t>)</m:t>
+                          <m:t> </m:t>
                         </m:r>
-                      </m:den>
-                    </m:f>
+                      </m:e>
+                    </m:nary>
                   </m:oMath>
                 </a14:m>
                 <a:endParaRPr lang="en-GB" sz="1600" dirty="0"/>
@@ -15569,7 +16037,7 @@
               <a:p>
                 <a:r>
                   <a:rPr lang="en-GB" sz="1600" dirty="0"/>
-                  <a:t>These metrics provide a balanced view of accuracy, consistency, and variance explanation.</a:t>
+                  <a:t>These metrics provide a balanced view of accuracy and variance explanation.</a:t>
                 </a:r>
               </a:p>
               <a:p>
@@ -15617,13 +16085,13 @@
             </p:nvSpPr>
             <p:spPr>
               <a:xfrm>
-                <a:off x="635124" y="2487865"/>
-                <a:ext cx="10921752" cy="3211477"/>
+                <a:off x="398981" y="2487865"/>
+                <a:ext cx="11394038" cy="3211477"/>
               </a:xfrm>
               <a:blipFill>
-                <a:blip r:embed="rId2"/>
+                <a:blip r:embed="rId3"/>
                 <a:stretch>
-                  <a:fillRect l="-56"/>
+                  <a:fillRect l="-53"/>
                 </a:stretch>
               </a:blipFill>
             </p:spPr>
@@ -15758,39 +16226,9 @@
           </a:p>
         </p:txBody>
       </p:sp>
-      <p:pic>
-        <p:nvPicPr>
-          <p:cNvPr id="5" name="Picture 4">
-            <a:extLst>
-              <a:ext uri="{FF2B5EF4-FFF2-40B4-BE49-F238E27FC236}">
-                <a16:creationId xmlns:a16="http://schemas.microsoft.com/office/drawing/2014/main" id="{D87E1213-A701-8F59-65B4-D21405F22B0A}"/>
-              </a:ext>
-            </a:extLst>
-          </p:cNvPr>
-          <p:cNvPicPr>
-            <a:picLocks noChangeAspect="1"/>
-          </p:cNvPicPr>
-          <p:nvPr/>
-        </p:nvPicPr>
-        <p:blipFill>
-          <a:blip r:embed="rId3"/>
-          <a:stretch>
-            <a:fillRect/>
-          </a:stretch>
-        </p:blipFill>
-        <p:spPr>
-          <a:xfrm>
-            <a:off x="268338" y="2765888"/>
-            <a:ext cx="11560457" cy="2469991"/>
-          </a:xfrm>
-          <a:prstGeom prst="rect">
-            <a:avLst/>
-          </a:prstGeom>
-        </p:spPr>
-      </p:pic>
-      <mc:AlternateContent xmlns:mc="http://schemas.openxmlformats.org/markup-compatibility/2006">
-        <mc:Choice xmlns:p14="http://schemas.microsoft.com/office/powerpoint/2010/main" Requires="p14">
-          <p:contentPart p14:bwMode="auto" r:id="rId4">
+      <mc:AlternateContent xmlns:mc="http://schemas.openxmlformats.org/markup-compatibility/2006" xmlns:p14="http://schemas.microsoft.com/office/powerpoint/2010/main">
+        <mc:Choice Requires="p14">
+          <p:contentPart p14:bwMode="auto" r:id="rId3">
             <p14:nvContentPartPr>
               <p14:cNvPr id="14" name="Ink 13">
                 <a:extLst>
@@ -15808,7 +16246,7 @@
             </p14:xfrm>
           </p:contentPart>
         </mc:Choice>
-        <mc:Fallback>
+        <mc:Fallback xmlns="">
           <p:pic>
             <p:nvPicPr>
               <p:cNvPr id="14" name="Ink 13">
@@ -15839,8 +16277,8 @@
           </p:pic>
         </mc:Fallback>
       </mc:AlternateContent>
-      <mc:AlternateContent xmlns:mc="http://schemas.openxmlformats.org/markup-compatibility/2006">
-        <mc:Choice xmlns:p14="http://schemas.microsoft.com/office/powerpoint/2010/main" Requires="p14">
+      <mc:AlternateContent xmlns:mc="http://schemas.openxmlformats.org/markup-compatibility/2006" xmlns:p14="http://schemas.microsoft.com/office/powerpoint/2010/main">
+        <mc:Choice Requires="p14">
           <p:contentPart p14:bwMode="auto" r:id="rId6">
             <p14:nvContentPartPr>
               <p14:cNvPr id="18" name="Ink 17">
@@ -15859,7 +16297,7 @@
             </p14:xfrm>
           </p:contentPart>
         </mc:Choice>
-        <mc:Fallback>
+        <mc:Fallback xmlns="">
           <p:pic>
             <p:nvPicPr>
               <p:cNvPr id="18" name="Ink 17">
@@ -15890,8 +16328,8 @@
           </p:pic>
         </mc:Fallback>
       </mc:AlternateContent>
-      <mc:AlternateContent xmlns:mc="http://schemas.openxmlformats.org/markup-compatibility/2006">
-        <mc:Choice xmlns:p14="http://schemas.microsoft.com/office/powerpoint/2010/main" Requires="p14">
+      <mc:AlternateContent xmlns:mc="http://schemas.openxmlformats.org/markup-compatibility/2006" xmlns:p14="http://schemas.microsoft.com/office/powerpoint/2010/main">
+        <mc:Choice Requires="p14">
           <p:contentPart p14:bwMode="auto" r:id="rId8">
             <p14:nvContentPartPr>
               <p14:cNvPr id="20" name="Ink 19">
@@ -15910,7 +16348,7 @@
             </p14:xfrm>
           </p:contentPart>
         </mc:Choice>
-        <mc:Fallback>
+        <mc:Fallback xmlns="">
           <p:pic>
             <p:nvPicPr>
               <p:cNvPr id="20" name="Ink 19">
@@ -15941,8 +16379,8 @@
           </p:pic>
         </mc:Fallback>
       </mc:AlternateContent>
-      <mc:AlternateContent xmlns:mc="http://schemas.openxmlformats.org/markup-compatibility/2006">
-        <mc:Choice xmlns:a14="http://schemas.microsoft.com/office/drawing/2010/main" Requires="a14">
+      <mc:AlternateContent xmlns:mc="http://schemas.openxmlformats.org/markup-compatibility/2006" xmlns:a14="http://schemas.microsoft.com/office/drawing/2010/main">
+        <mc:Choice Requires="a14">
           <p:sp>
             <p:nvSpPr>
               <p:cNvPr id="21" name="TextBox 20">
@@ -15971,6 +16409,7 @@
               </a:bodyPr>
               <a:lstStyle/>
               <a:p>
+                <a:pPr/>
                 <a14:m>
                   <m:oMathPara xmlns:m="http://schemas.openxmlformats.org/officeDocument/2006/math">
                     <m:oMathParaPr>
@@ -16069,7 +16508,7 @@
             </p:txBody>
           </p:sp>
         </mc:Choice>
-        <mc:Fallback>
+        <mc:Fallback xmlns="">
           <p:sp>
             <p:nvSpPr>
               <p:cNvPr id="21" name="TextBox 20">
@@ -16158,6 +16597,291 @@
           </a:p>
         </p:txBody>
       </p:sp>
+      <mc:AlternateContent xmlns:mc="http://schemas.openxmlformats.org/markup-compatibility/2006">
+        <mc:Choice xmlns:p14="http://schemas.microsoft.com/office/powerpoint/2010/main" Requires="p14">
+          <p:contentPart p14:bwMode="auto" r:id="rId11">
+            <p14:nvContentPartPr>
+              <p14:cNvPr id="8" name="Ink 7">
+                <a:extLst>
+                  <a:ext uri="{FF2B5EF4-FFF2-40B4-BE49-F238E27FC236}">
+                    <a16:creationId xmlns:a16="http://schemas.microsoft.com/office/drawing/2014/main" id="{F0E16E5C-90FD-A88F-DEC2-947E0F1312DA}"/>
+                  </a:ext>
+                </a:extLst>
+              </p14:cNvPr>
+              <p14:cNvContentPartPr/>
+              <p14:nvPr/>
+            </p14:nvContentPartPr>
+            <p14:xfrm>
+              <a:off x="4038948" y="4638694"/>
+              <a:ext cx="784080" cy="56160"/>
+            </p14:xfrm>
+          </p:contentPart>
+        </mc:Choice>
+        <mc:Fallback>
+          <p:pic>
+            <p:nvPicPr>
+              <p:cNvPr id="8" name="Ink 7">
+                <a:extLst>
+                  <a:ext uri="{FF2B5EF4-FFF2-40B4-BE49-F238E27FC236}">
+                    <a16:creationId xmlns:a16="http://schemas.microsoft.com/office/drawing/2014/main" id="{F0E16E5C-90FD-A88F-DEC2-947E0F1312DA}"/>
+                  </a:ext>
+                </a:extLst>
+              </p:cNvPr>
+              <p:cNvPicPr/>
+              <p:nvPr/>
+            </p:nvPicPr>
+            <p:blipFill>
+              <a:blip r:embed="rId12"/>
+              <a:stretch>
+                <a:fillRect/>
+              </a:stretch>
+            </p:blipFill>
+            <p:spPr>
+              <a:xfrm>
+                <a:off x="3984948" y="4530694"/>
+                <a:ext cx="891720" cy="271800"/>
+              </a:xfrm>
+              <a:prstGeom prst="rect">
+                <a:avLst/>
+              </a:prstGeom>
+            </p:spPr>
+          </p:pic>
+        </mc:Fallback>
+      </mc:AlternateContent>
+      <mc:AlternateContent xmlns:mc="http://schemas.openxmlformats.org/markup-compatibility/2006">
+        <mc:Choice xmlns:p14="http://schemas.microsoft.com/office/powerpoint/2010/main" Requires="p14">
+          <p:contentPart p14:bwMode="auto" r:id="rId13">
+            <p14:nvContentPartPr>
+              <p14:cNvPr id="9" name="Ink 8">
+                <a:extLst>
+                  <a:ext uri="{FF2B5EF4-FFF2-40B4-BE49-F238E27FC236}">
+                    <a16:creationId xmlns:a16="http://schemas.microsoft.com/office/drawing/2014/main" id="{E8D68AED-7726-382E-0B27-530B3781220B}"/>
+                  </a:ext>
+                </a:extLst>
+              </p14:cNvPr>
+              <p14:cNvContentPartPr/>
+              <p14:nvPr/>
+            </p14:nvContentPartPr>
+            <p14:xfrm>
+              <a:off x="325548" y="4621774"/>
+              <a:ext cx="2406600" cy="103320"/>
+            </p14:xfrm>
+          </p:contentPart>
+        </mc:Choice>
+        <mc:Fallback>
+          <p:pic>
+            <p:nvPicPr>
+              <p:cNvPr id="9" name="Ink 8">
+                <a:extLst>
+                  <a:ext uri="{FF2B5EF4-FFF2-40B4-BE49-F238E27FC236}">
+                    <a16:creationId xmlns:a16="http://schemas.microsoft.com/office/drawing/2014/main" id="{E8D68AED-7726-382E-0B27-530B3781220B}"/>
+                  </a:ext>
+                </a:extLst>
+              </p:cNvPr>
+              <p:cNvPicPr/>
+              <p:nvPr/>
+            </p:nvPicPr>
+            <p:blipFill>
+              <a:blip r:embed="rId14"/>
+              <a:stretch>
+                <a:fillRect/>
+              </a:stretch>
+            </p:blipFill>
+            <p:spPr>
+              <a:xfrm>
+                <a:off x="271548" y="4514134"/>
+                <a:ext cx="2514240" cy="318960"/>
+              </a:xfrm>
+              <a:prstGeom prst="rect">
+                <a:avLst/>
+              </a:prstGeom>
+            </p:spPr>
+          </p:pic>
+        </mc:Fallback>
+      </mc:AlternateContent>
+      <p:pic>
+        <p:nvPicPr>
+          <p:cNvPr id="11" name="Picture 10">
+            <a:extLst>
+              <a:ext uri="{FF2B5EF4-FFF2-40B4-BE49-F238E27FC236}">
+                <a16:creationId xmlns:a16="http://schemas.microsoft.com/office/drawing/2014/main" id="{6DB1E6D7-5571-77E0-882E-20EBF7FF4A3C}"/>
+              </a:ext>
+            </a:extLst>
+          </p:cNvPr>
+          <p:cNvPicPr>
+            <a:picLocks noChangeAspect="1"/>
+          </p:cNvPicPr>
+          <p:nvPr/>
+        </p:nvPicPr>
+        <p:blipFill>
+          <a:blip r:embed="rId15"/>
+          <a:stretch>
+            <a:fillRect/>
+          </a:stretch>
+        </p:blipFill>
+        <p:spPr>
+          <a:xfrm>
+            <a:off x="255959" y="2797754"/>
+            <a:ext cx="11483038" cy="2425599"/>
+          </a:xfrm>
+          <a:prstGeom prst="rect">
+            <a:avLst/>
+          </a:prstGeom>
+        </p:spPr>
+      </p:pic>
+      <mc:AlternateContent xmlns:mc="http://schemas.openxmlformats.org/markup-compatibility/2006">
+        <mc:Choice xmlns:p14="http://schemas.microsoft.com/office/powerpoint/2010/main" Requires="p14">
+          <p:contentPart p14:bwMode="auto" r:id="rId16">
+            <p14:nvContentPartPr>
+              <p14:cNvPr id="12" name="Ink 11">
+                <a:extLst>
+                  <a:ext uri="{FF2B5EF4-FFF2-40B4-BE49-F238E27FC236}">
+                    <a16:creationId xmlns:a16="http://schemas.microsoft.com/office/drawing/2014/main" id="{0971CC2A-A53C-6D3C-83F4-95198233D02C}"/>
+                  </a:ext>
+                </a:extLst>
+              </p14:cNvPr>
+              <p14:cNvContentPartPr/>
+              <p14:nvPr/>
+            </p14:nvContentPartPr>
+            <p14:xfrm>
+              <a:off x="4233565" y="4634374"/>
+              <a:ext cx="937800" cy="63720"/>
+            </p14:xfrm>
+          </p:contentPart>
+        </mc:Choice>
+        <mc:Fallback>
+          <p:pic>
+            <p:nvPicPr>
+              <p:cNvPr id="12" name="Ink 11">
+                <a:extLst>
+                  <a:ext uri="{FF2B5EF4-FFF2-40B4-BE49-F238E27FC236}">
+                    <a16:creationId xmlns:a16="http://schemas.microsoft.com/office/drawing/2014/main" id="{0971CC2A-A53C-6D3C-83F4-95198233D02C}"/>
+                  </a:ext>
+                </a:extLst>
+              </p:cNvPr>
+              <p:cNvPicPr/>
+              <p:nvPr/>
+            </p:nvPicPr>
+            <p:blipFill>
+              <a:blip r:embed="rId17"/>
+              <a:stretch>
+                <a:fillRect/>
+              </a:stretch>
+            </p:blipFill>
+            <p:spPr>
+              <a:xfrm>
+                <a:off x="4179925" y="4526374"/>
+                <a:ext cx="1045440" cy="279360"/>
+              </a:xfrm>
+              <a:prstGeom prst="rect">
+                <a:avLst/>
+              </a:prstGeom>
+            </p:spPr>
+          </p:pic>
+        </mc:Fallback>
+      </mc:AlternateContent>
+      <mc:AlternateContent xmlns:mc="http://schemas.openxmlformats.org/markup-compatibility/2006">
+        <mc:Choice xmlns:p14="http://schemas.microsoft.com/office/powerpoint/2010/main" Requires="p14">
+          <p:contentPart p14:bwMode="auto" r:id="rId18">
+            <p14:nvContentPartPr>
+              <p14:cNvPr id="13" name="Ink 12">
+                <a:extLst>
+                  <a:ext uri="{FF2B5EF4-FFF2-40B4-BE49-F238E27FC236}">
+                    <a16:creationId xmlns:a16="http://schemas.microsoft.com/office/drawing/2014/main" id="{2E140201-B480-0BD6-6282-2C1E6AD47CD7}"/>
+                  </a:ext>
+                </a:extLst>
+              </p14:cNvPr>
+              <p14:cNvContentPartPr/>
+              <p14:nvPr/>
+            </p14:nvContentPartPr>
+            <p14:xfrm>
+              <a:off x="1553005" y="4934974"/>
+              <a:ext cx="917640" cy="63720"/>
+            </p14:xfrm>
+          </p:contentPart>
+        </mc:Choice>
+        <mc:Fallback>
+          <p:pic>
+            <p:nvPicPr>
+              <p:cNvPr id="13" name="Ink 12">
+                <a:extLst>
+                  <a:ext uri="{FF2B5EF4-FFF2-40B4-BE49-F238E27FC236}">
+                    <a16:creationId xmlns:a16="http://schemas.microsoft.com/office/drawing/2014/main" id="{2E140201-B480-0BD6-6282-2C1E6AD47CD7}"/>
+                  </a:ext>
+                </a:extLst>
+              </p:cNvPr>
+              <p:cNvPicPr/>
+              <p:nvPr/>
+            </p:nvPicPr>
+            <p:blipFill>
+              <a:blip r:embed="rId19"/>
+              <a:stretch>
+                <a:fillRect/>
+              </a:stretch>
+            </p:blipFill>
+            <p:spPr>
+              <a:xfrm>
+                <a:off x="1499005" y="4827334"/>
+                <a:ext cx="1025280" cy="279360"/>
+              </a:xfrm>
+              <a:prstGeom prst="rect">
+                <a:avLst/>
+              </a:prstGeom>
+            </p:spPr>
+          </p:pic>
+        </mc:Fallback>
+      </mc:AlternateContent>
+      <mc:AlternateContent xmlns:mc="http://schemas.openxmlformats.org/markup-compatibility/2006">
+        <mc:Choice xmlns:p14="http://schemas.microsoft.com/office/powerpoint/2010/main" Requires="p14">
+          <p:contentPart p14:bwMode="auto" r:id="rId20">
+            <p14:nvContentPartPr>
+              <p14:cNvPr id="16" name="Ink 15">
+                <a:extLst>
+                  <a:ext uri="{FF2B5EF4-FFF2-40B4-BE49-F238E27FC236}">
+                    <a16:creationId xmlns:a16="http://schemas.microsoft.com/office/drawing/2014/main" id="{9880B34A-30A2-F3DE-5B37-289C2DDA838B}"/>
+                  </a:ext>
+                </a:extLst>
+              </p14:cNvPr>
+              <p14:cNvContentPartPr/>
+              <p14:nvPr/>
+            </p14:nvContentPartPr>
+            <p14:xfrm>
+              <a:off x="506125" y="4659574"/>
+              <a:ext cx="2399760" cy="13680"/>
+            </p14:xfrm>
+          </p:contentPart>
+        </mc:Choice>
+        <mc:Fallback>
+          <p:pic>
+            <p:nvPicPr>
+              <p:cNvPr id="16" name="Ink 15">
+                <a:extLst>
+                  <a:ext uri="{FF2B5EF4-FFF2-40B4-BE49-F238E27FC236}">
+                    <a16:creationId xmlns:a16="http://schemas.microsoft.com/office/drawing/2014/main" id="{9880B34A-30A2-F3DE-5B37-289C2DDA838B}"/>
+                  </a:ext>
+                </a:extLst>
+              </p:cNvPr>
+              <p:cNvPicPr/>
+              <p:nvPr/>
+            </p:nvPicPr>
+            <p:blipFill>
+              <a:blip r:embed="rId21"/>
+              <a:stretch>
+                <a:fillRect/>
+              </a:stretch>
+            </p:blipFill>
+            <p:spPr>
+              <a:xfrm>
+                <a:off x="452485" y="4551934"/>
+                <a:ext cx="2507400" cy="229320"/>
+              </a:xfrm>
+              <a:prstGeom prst="rect">
+                <a:avLst/>
+              </a:prstGeom>
+            </p:spPr>
+          </p:pic>
+        </mc:Fallback>
+      </mc:AlternateContent>
     </p:spTree>
     <p:extLst>
       <p:ext uri="{BB962C8B-B14F-4D97-AF65-F5344CB8AC3E}">
@@ -16258,10 +16982,10 @@
       </p:sp>
       <p:pic>
         <p:nvPicPr>
-          <p:cNvPr id="5" name="Content Placeholder 4" descr="A graph of a bar chart&#10;&#10;AI-generated content may be incorrect.">
+          <p:cNvPr id="12" name="Content Placeholder 11" descr="A graph with different colored rectangles&#10;&#10;AI-generated content may be incorrect.">
             <a:extLst>
               <a:ext uri="{FF2B5EF4-FFF2-40B4-BE49-F238E27FC236}">
-                <a16:creationId xmlns:a16="http://schemas.microsoft.com/office/drawing/2014/main" id="{FA4A40A3-E47F-FDCC-5726-8C63D6C51E21}"/>
+                <a16:creationId xmlns:a16="http://schemas.microsoft.com/office/drawing/2014/main" id="{5C322EDC-E681-2AE6-85F9-1EC96763D829}"/>
               </a:ext>
             </a:extLst>
           </p:cNvPr>
@@ -16280,19 +17004,15 @@
               </a:ext>
             </a:extLst>
           </a:blip>
-          <a:srcRect t="-1364" b="1"/>
           <a:stretch>
             <a:fillRect/>
           </a:stretch>
         </p:blipFill>
         <p:spPr>
           <a:xfrm>
-            <a:off x="0" y="-162838"/>
-            <a:ext cx="12191980" cy="7384093"/>
+            <a:off x="127349" y="0"/>
+            <a:ext cx="11761938" cy="6664271"/>
           </a:xfrm>
-          <a:prstGeom prst="rect">
-            <a:avLst/>
-          </a:prstGeom>
         </p:spPr>
       </p:pic>
     </p:spTree>
@@ -16371,8 +17091,8 @@
           </a:p>
         </p:txBody>
       </p:sp>
-      <mc:AlternateContent xmlns:mc="http://schemas.openxmlformats.org/markup-compatibility/2006">
-        <mc:Choice xmlns:a14="http://schemas.microsoft.com/office/drawing/2010/main" Requires="a14">
+      <mc:AlternateContent xmlns:mc="http://schemas.openxmlformats.org/markup-compatibility/2006" xmlns:a14="http://schemas.microsoft.com/office/drawing/2010/main">
+        <mc:Choice Requires="a14">
           <p:sp>
             <p:nvSpPr>
               <p:cNvPr id="7" name="Content Placeholder 6">
@@ -16491,7 +17211,7 @@
             </p:txBody>
           </p:sp>
         </mc:Choice>
-        <mc:Fallback>
+        <mc:Fallback xmlns="">
           <p:sp>
             <p:nvSpPr>
               <p:cNvPr id="7" name="Content Placeholder 6">
@@ -16673,7 +17393,7 @@
         </p:nvSpPr>
         <p:spPr>
           <a:xfrm>
-            <a:off x="666438" y="2616026"/>
+            <a:off x="967063" y="2616026"/>
             <a:ext cx="8825659" cy="2770166"/>
           </a:xfrm>
         </p:spPr>
@@ -17197,8 +17917,16 @@
               <a:rPr lang="en-IL" sz="2300" dirty="0"/>
             </a:br>
             <a:r>
+              <a:rPr lang="en-GB" sz="2300"/>
+              <a:t>-</a:t>
+            </a:r>
+            <a:r>
+              <a:rPr lang="en-IL" sz="2300"/>
+              <a:t> </a:t>
+            </a:r>
+            <a:r>
               <a:rPr lang="en-IL" sz="2300" dirty="0"/>
-              <a:t>— promising, but with room to grow</a:t>
+              <a:t>promising, but with room to grow</a:t>
             </a:r>
           </a:p>
         </p:txBody>
@@ -17645,7 +18373,7 @@
                 </a:r>
                 <a:r>
                   <a:rPr lang="en-GB" sz="1400" dirty="0"/>
-                  <a:t>(2016, 2018, 2020, 2021) – 4 pollutants: O₃, CO, NO₂, PM₂.₅</a:t>
+                  <a:t>(2016, 2018, 2020, 2021) - 4 pollutants: O₃, CO, NO₂, PM₂.₅</a:t>
                 </a:r>
               </a:p>
               <a:p>
@@ -17664,7 +18392,7 @@
                 </a:r>
                 <a:r>
                   <a:rPr lang="en-GB" sz="1400" dirty="0"/>
-                  <a:t>– historical daily weather data.</a:t>
+                  <a:t>- historical daily weather data.</a:t>
                 </a:r>
               </a:p>
               <a:p>
@@ -18929,7 +19657,7 @@
             </a:br>
             <a:r>
               <a:rPr lang="en-GB" sz="2400" i="1" dirty="0"/>
-              <a:t>Exploratory Data Analysis – Correlations</a:t>
+              <a:t>Exploratory Data Analysis - Correlations</a:t>
             </a:r>
             <a:endParaRPr lang="en-US" sz="2400" i="1" dirty="0">
               <a:solidFill>
@@ -20342,41 +21070,6 @@
           </a:p>
         </p:txBody>
       </p:sp>
-      <p:pic>
-        <p:nvPicPr>
-          <p:cNvPr id="7" name="Content Placeholder 6" descr="A graph of different colored bars&#10;&#10;AI-generated content may be incorrect.">
-            <a:extLst>
-              <a:ext uri="{FF2B5EF4-FFF2-40B4-BE49-F238E27FC236}">
-                <a16:creationId xmlns:a16="http://schemas.microsoft.com/office/drawing/2014/main" id="{1FB2A2F3-51D9-543B-F5C7-673FD45C1B86}"/>
-              </a:ext>
-            </a:extLst>
-          </p:cNvPr>
-          <p:cNvPicPr>
-            <a:picLocks noGrp="1" noChangeAspect="1"/>
-          </p:cNvPicPr>
-          <p:nvPr>
-            <p:ph idx="1"/>
-          </p:nvPr>
-        </p:nvPicPr>
-        <p:blipFill>
-          <a:blip r:embed="rId3">
-            <a:extLst>
-              <a:ext uri="{28A0092B-C50C-407E-A947-70E740481C1C}">
-                <a14:useLocalDpi xmlns:a14="http://schemas.microsoft.com/office/drawing/2010/main" val="0"/>
-              </a:ext>
-            </a:extLst>
-          </a:blip>
-          <a:stretch>
-            <a:fillRect/>
-          </a:stretch>
-        </p:blipFill>
-        <p:spPr>
-          <a:xfrm>
-            <a:off x="966592" y="2371768"/>
-            <a:ext cx="10258816" cy="4486232"/>
-          </a:xfrm>
-        </p:spPr>
-      </p:pic>
       <p:sp>
         <p:nvSpPr>
           <p:cNvPr id="8" name="TextBox 7">
@@ -20421,6 +21114,41 @@
           </a:p>
         </p:txBody>
       </p:sp>
+      <p:pic>
+        <p:nvPicPr>
+          <p:cNvPr id="6" name="Content Placeholder 5" descr="A bar graph with numbers and text&#10;&#10;AI-generated content may be incorrect.">
+            <a:extLst>
+              <a:ext uri="{FF2B5EF4-FFF2-40B4-BE49-F238E27FC236}">
+                <a16:creationId xmlns:a16="http://schemas.microsoft.com/office/drawing/2014/main" id="{B8FEFF53-56F0-FC8B-94B2-8C29D2C6010B}"/>
+              </a:ext>
+            </a:extLst>
+          </p:cNvPr>
+          <p:cNvPicPr>
+            <a:picLocks noGrp="1" noChangeAspect="1"/>
+          </p:cNvPicPr>
+          <p:nvPr>
+            <p:ph idx="1"/>
+          </p:nvPr>
+        </p:nvPicPr>
+        <p:blipFill>
+          <a:blip r:embed="rId3">
+            <a:extLst>
+              <a:ext uri="{28A0092B-C50C-407E-A947-70E740481C1C}">
+                <a14:useLocalDpi xmlns:a14="http://schemas.microsoft.com/office/drawing/2010/main" val="0"/>
+              </a:ext>
+            </a:extLst>
+          </a:blip>
+          <a:stretch>
+            <a:fillRect/>
+          </a:stretch>
+        </p:blipFill>
+        <p:spPr>
+          <a:xfrm>
+            <a:off x="576197" y="2279737"/>
+            <a:ext cx="11223319" cy="4421687"/>
+          </a:xfrm>
+        </p:spPr>
+      </p:pic>
     </p:spTree>
     <p:extLst>
       <p:ext uri="{BB962C8B-B14F-4D97-AF65-F5344CB8AC3E}">
@@ -20501,8 +21229,8 @@
           </a:p>
         </p:txBody>
       </p:sp>
-      <mc:AlternateContent xmlns:mc="http://schemas.openxmlformats.org/markup-compatibility/2006">
-        <mc:Choice xmlns:a14="http://schemas.microsoft.com/office/drawing/2010/main" Requires="a14">
+      <mc:AlternateContent xmlns:mc="http://schemas.openxmlformats.org/markup-compatibility/2006" xmlns:a14="http://schemas.microsoft.com/office/drawing/2010/main">
+        <mc:Choice Requires="a14">
           <p:sp>
             <p:nvSpPr>
               <p:cNvPr id="3" name="Content Placeholder 2">
@@ -20617,7 +21345,7 @@
                       <a:rPr lang="en-GB" i="1" dirty="0" smtClean="0">
                         <a:latin typeface="Cambria Math" panose="02040503050406030204" pitchFamily="18" charset="0"/>
                       </a:rPr>
-                      <m:t>-</m:t>
+                      <m:t>−</m:t>
                     </m:r>
                     <m:r>
                       <m:rPr>
@@ -20758,7 +21486,7 @@
             </p:txBody>
           </p:sp>
         </mc:Choice>
-        <mc:Fallback>
+        <mc:Fallback xmlns="">
           <p:sp>
             <p:nvSpPr>
               <p:cNvPr id="3" name="Content Placeholder 2">
@@ -20964,7 +21692,15 @@
               <a:p>
                 <a:r>
                   <a:rPr lang="en-GB" sz="5600" dirty="0"/>
-                  <a:t>5 fully connected layers with ReLU + BatchNorm</a:t>
+                  <a:t>Fully connected layers with </a:t>
+                </a:r>
+                <a:r>
+                  <a:rPr lang="en-GB" sz="5600" dirty="0" err="1"/>
+                  <a:t>LeakyReLU</a:t>
+                </a:r>
+                <a:r>
+                  <a:rPr lang="en-GB" sz="5600" dirty="0"/>
+                  <a:t> + BatchNorm</a:t>
                 </a:r>
               </a:p>
               <a:p>
@@ -20977,7 +21713,9 @@
                 <a:pPr marL="0" indent="0">
                   <a:buNone/>
                 </a:pPr>
-                <a:endParaRPr lang="en-GB" sz="5600" dirty="0"/>
+                <a:endParaRPr lang="en-GB" sz="5600" i="1" dirty="0">
+                  <a:latin typeface="Cambria Math" panose="02040503050406030204" pitchFamily="18" charset="0"/>
+                </a:endParaRPr>
               </a:p>
               <a:p>
                 <a:pPr marL="0" indent="0">
@@ -20999,13 +21737,84 @@
                         <a:rPr lang="en-GB" sz="5600" i="1" dirty="0" smtClean="0">
                           <a:latin typeface="Cambria Math" panose="02040503050406030204" pitchFamily="18" charset="0"/>
                         </a:rPr>
-                        <m:t> (39) → 64 → 128 → 64</m:t>
+                        <m:t> </m:t>
+                      </m:r>
+                      <m:d>
+                        <m:dPr>
+                          <m:ctrlPr>
+                            <a:rPr lang="en-GB" sz="5600" i="1" dirty="0" smtClean="0">
+                              <a:latin typeface="Cambria Math" panose="02040503050406030204" pitchFamily="18" charset="0"/>
+                            </a:rPr>
+                          </m:ctrlPr>
+                        </m:dPr>
+                        <m:e>
+                          <m:r>
+                            <a:rPr lang="en-GB" sz="5600" i="1" dirty="0" smtClean="0">
+                              <a:latin typeface="Cambria Math" panose="02040503050406030204" pitchFamily="18" charset="0"/>
+                            </a:rPr>
+                            <m:t>39</m:t>
+                          </m:r>
+                        </m:e>
+                      </m:d>
+                      <m:r>
+                        <a:rPr lang="en-GB" sz="5600" i="1" dirty="0" smtClean="0">
+                          <a:latin typeface="Cambria Math" panose="02040503050406030204" pitchFamily="18" charset="0"/>
+                        </a:rPr>
+                        <m:t>→</m:t>
+                      </m:r>
+                      <m:r>
+                        <a:rPr lang="en-GB" sz="5600" b="0" i="1" dirty="0" smtClean="0">
+                          <a:latin typeface="Cambria Math" panose="02040503050406030204" pitchFamily="18" charset="0"/>
+                        </a:rPr>
+                        <m:t>128</m:t>
+                      </m:r>
+                      <m:r>
+                        <a:rPr lang="en-GB" sz="5600" i="1" dirty="0" smtClean="0">
+                          <a:latin typeface="Cambria Math" panose="02040503050406030204" pitchFamily="18" charset="0"/>
+                        </a:rPr>
+                        <m:t> →</m:t>
+                      </m:r>
+                      <m:r>
+                        <a:rPr lang="en-GB" sz="5600" b="0" i="1" dirty="0" smtClean="0">
+                          <a:latin typeface="Cambria Math" panose="02040503050406030204" pitchFamily="18" charset="0"/>
+                        </a:rPr>
+                        <m:t>256</m:t>
+                      </m:r>
+                      <m:r>
+                        <a:rPr lang="en-GB" sz="5600" i="1" dirty="0" smtClean="0">
+                          <a:latin typeface="Cambria Math" panose="02040503050406030204" pitchFamily="18" charset="0"/>
+                        </a:rPr>
+                        <m:t> →</m:t>
+                      </m:r>
+                      <m:r>
+                        <a:rPr lang="en-GB" sz="5600" b="0" i="1" dirty="0" smtClean="0">
+                          <a:latin typeface="Cambria Math" panose="02040503050406030204" pitchFamily="18" charset="0"/>
+                        </a:rPr>
+                        <m:t>512</m:t>
                       </m:r>
                       <m:r>
                         <a:rPr lang="en-GB" sz="5600" i="1" dirty="0">
                           <a:latin typeface="Cambria Math" panose="02040503050406030204" pitchFamily="18" charset="0"/>
                         </a:rPr>
-                        <m:t> → 32 → 1</m:t>
+                        <m:t> →</m:t>
+                      </m:r>
+                      <m:r>
+                        <a:rPr lang="en-GB" sz="5600" b="0" i="1" dirty="0" smtClean="0">
+                          <a:latin typeface="Cambria Math" panose="02040503050406030204" pitchFamily="18" charset="0"/>
+                        </a:rPr>
+                        <m:t>256</m:t>
+                      </m:r>
+                      <m:r>
+                        <a:rPr lang="en-GB" sz="5600" i="1" dirty="0">
+                          <a:latin typeface="Cambria Math" panose="02040503050406030204" pitchFamily="18" charset="0"/>
+                        </a:rPr>
+                        <m:t> →</m:t>
+                      </m:r>
+                      <m:r>
+                        <a:rPr lang="en-GB" sz="5600" b="0" i="1" dirty="0" smtClean="0">
+                          <a:latin typeface="Cambria Math" panose="02040503050406030204" pitchFamily="18" charset="0"/>
+                        </a:rPr>
+                        <m:t>128→32 →1</m:t>
                       </m:r>
                     </m:oMath>
                   </m:oMathPara>

</xml_diff>